<commit_message>
Final version of Byte 6 and an update to a bug in Byte 5.
</commit_message>
<xml_diff>
--- a/Lectures/Byte6.pptx
+++ b/Lectures/Byte6.pptx
@@ -199,7 +199,7 @@
           <a:p>
             <a:fld id="{D3AAB66F-B1B7-D045-B4E8-4F60236F228D}" type="datetimeFigureOut">
               <a:rPr lang="en-US" smtClean="0"/>
-              <a:t>3/22/14</a:t>
+              <a:t>3/25/14</a:t>
             </a:fld>
             <a:endParaRPr lang="en-US"/>
           </a:p>
@@ -365,7 +365,7 @@
           <a:p>
             <a:fld id="{BCCF8E76-06A6-164E-A6FA-EC32C13EB232}" type="datetimeFigureOut">
               <a:rPr lang="en-US" smtClean="0"/>
-              <a:t>3/22/14</a:t>
+              <a:t>3/25/14</a:t>
             </a:fld>
             <a:endParaRPr lang="en-US"/>
           </a:p>
@@ -1151,7 +1151,7 @@
             <a:fld id="{FA3C144B-2939-9A49-B014-915EC3E81866}" type="datetime1">
               <a:rPr lang="en-US" smtClean="0"/>
               <a:pPr/>
-              <a:t>3/22/14</a:t>
+              <a:t>3/25/14</a:t>
             </a:fld>
             <a:endParaRPr lang="en-US" dirty="0"/>
           </a:p>
@@ -1580,7 +1580,7 @@
           <a:p>
             <a:fld id="{76838339-A875-5E45-AB3F-AAABD270346A}" type="datetime1">
               <a:rPr lang="en-US" smtClean="0"/>
-              <a:t>3/22/14</a:t>
+              <a:t>3/25/14</a:t>
             </a:fld>
             <a:endParaRPr lang="en-US"/>
           </a:p>
@@ -1866,7 +1866,7 @@
             <a:fld id="{FA3C144B-2939-9A49-B014-915EC3E81866}" type="datetime1">
               <a:rPr lang="en-US" smtClean="0"/>
               <a:pPr/>
-              <a:t>3/22/14</a:t>
+              <a:t>3/25/14</a:t>
             </a:fld>
             <a:endParaRPr lang="en-US" dirty="0"/>
           </a:p>
@@ -2348,7 +2348,7 @@
           <a:p>
             <a:fld id="{A73F672F-A5FB-5745-934A-1BF51CA5539C}" type="datetime1">
               <a:rPr lang="en-US" smtClean="0"/>
-              <a:t>3/22/14</a:t>
+              <a:t>3/25/14</a:t>
             </a:fld>
             <a:endParaRPr lang="en-US"/>
           </a:p>
@@ -2690,7 +2690,7 @@
             <a:fld id="{FA3C144B-2939-9A49-B014-915EC3E81866}" type="datetime1">
               <a:rPr lang="en-US" smtClean="0"/>
               <a:pPr/>
-              <a:t>3/22/14</a:t>
+              <a:t>3/25/14</a:t>
             </a:fld>
             <a:endParaRPr lang="en-US" dirty="0"/>
           </a:p>
@@ -3154,7 +3154,7 @@
           <a:p>
             <a:fld id="{6AFE6A63-5EBE-3E48-B0AE-DF655A1ECE76}" type="datetime1">
               <a:rPr lang="en-US" smtClean="0"/>
-              <a:t>3/22/14</a:t>
+              <a:t>3/25/14</a:t>
             </a:fld>
             <a:endParaRPr lang="en-US"/>
           </a:p>
@@ -3473,7 +3473,7 @@
           <a:p>
             <a:fld id="{4A019F0C-9D18-B54A-9AC9-18AA74EDB034}" type="datetime1">
               <a:rPr lang="en-US" smtClean="0"/>
-              <a:t>3/22/14</a:t>
+              <a:t>3/25/14</a:t>
             </a:fld>
             <a:endParaRPr lang="en-US"/>
           </a:p>
@@ -3783,7 +3783,7 @@
             <a:fld id="{FA3C144B-2939-9A49-B014-915EC3E81866}" type="datetime1">
               <a:rPr lang="en-US" smtClean="0"/>
               <a:pPr/>
-              <a:t>3/22/14</a:t>
+              <a:t>3/25/14</a:t>
             </a:fld>
             <a:endParaRPr lang="en-US" dirty="0"/>
           </a:p>
@@ -4046,7 +4046,7 @@
           <a:p>
             <a:fld id="{FA3C144B-2939-9A49-B014-915EC3E81866}" type="datetime1">
               <a:rPr lang="en-US" smtClean="0"/>
-              <a:t>3/22/14</a:t>
+              <a:t>3/25/14</a:t>
             </a:fld>
             <a:endParaRPr lang="en-US" dirty="0"/>
           </a:p>
@@ -4414,7 +4414,7 @@
           <a:p>
             <a:fld id="{7053BEFA-1175-F644-B249-7D41D72BD3FF}" type="datetime1">
               <a:rPr lang="en-US" smtClean="0"/>
-              <a:t>3/22/14</a:t>
+              <a:t>3/25/14</a:t>
             </a:fld>
             <a:endParaRPr lang="en-US"/>
           </a:p>
@@ -4533,7 +4533,7 @@
             <a:fld id="{FA3C144B-2939-9A49-B014-915EC3E81866}" type="datetime1">
               <a:rPr lang="en-US" smtClean="0"/>
               <a:pPr/>
-              <a:t>3/22/14</a:t>
+              <a:t>3/25/14</a:t>
             </a:fld>
             <a:endParaRPr lang="en-US" dirty="0"/>
           </a:p>
@@ -4750,7 +4750,7 @@
             <a:fld id="{FA3C144B-2939-9A49-B014-915EC3E81866}" type="datetime1">
               <a:rPr lang="en-US" smtClean="0"/>
               <a:pPr/>
-              <a:t>3/22/14</a:t>
+              <a:t>3/25/14</a:t>
             </a:fld>
             <a:endParaRPr lang="en-US" dirty="0"/>
           </a:p>
@@ -4995,7 +4995,7 @@
             <a:fld id="{FA3C144B-2939-9A49-B014-915EC3E81866}" type="datetime1">
               <a:rPr lang="en-US" smtClean="0"/>
               <a:pPr/>
-              <a:t>3/22/14</a:t>
+              <a:t>3/25/14</a:t>
             </a:fld>
             <a:endParaRPr lang="en-US" dirty="0"/>
           </a:p>
@@ -5373,7 +5373,7 @@
           <a:p>
             <a:fld id="{111EEF3B-ABF2-AA4E-9E24-0C6256942674}" type="datetime1">
               <a:rPr lang="en-US" smtClean="0"/>
-              <a:t>3/22/14</a:t>
+              <a:t>3/25/14</a:t>
             </a:fld>
             <a:endParaRPr lang="en-US"/>
           </a:p>
@@ -5537,7 +5537,7 @@
             <a:fld id="{FA3C144B-2939-9A49-B014-915EC3E81866}" type="datetime1">
               <a:rPr lang="en-US" smtClean="0"/>
               <a:pPr/>
-              <a:t>3/22/14</a:t>
+              <a:t>3/25/14</a:t>
             </a:fld>
             <a:endParaRPr lang="en-US" dirty="0"/>
           </a:p>
@@ -5954,7 +5954,7 @@
             <a:fld id="{FA3C144B-2939-9A49-B014-915EC3E81866}" type="datetime1">
               <a:rPr lang="en-US" smtClean="0"/>
               <a:pPr/>
-              <a:t>3/22/14</a:t>
+              <a:t>3/25/14</a:t>
             </a:fld>
             <a:endParaRPr lang="en-US" dirty="0"/>
           </a:p>
@@ -6270,7 +6270,7 @@
             <a:fld id="{FA3C144B-2939-9A49-B014-915EC3E81866}" type="datetime1">
               <a:rPr lang="en-US" smtClean="0"/>
               <a:pPr/>
-              <a:t>3/22/14</a:t>
+              <a:t>3/25/14</a:t>
             </a:fld>
             <a:endParaRPr lang="en-US" dirty="0"/>
           </a:p>
@@ -6936,7 +6936,7 @@
             <a:fld id="{FA3C144B-2939-9A49-B014-915EC3E81866}" type="datetime1">
               <a:rPr lang="en-US" smtClean="0"/>
               <a:pPr/>
-              <a:t>3/22/14</a:t>
+              <a:t>3/25/14</a:t>
             </a:fld>
             <a:endParaRPr lang="en-US" dirty="0"/>
           </a:p>
@@ -7662,11 +7662,7 @@
           <a:p>
             <a:r>
               <a:rPr lang="en-US" dirty="0" smtClean="0"/>
-              <a:t>Byte </a:t>
-            </a:r>
-            <a:r>
-              <a:rPr lang="en-US" dirty="0" smtClean="0"/>
-              <a:t>6: Big Data</a:t>
+              <a:t>Byte 6: Big Data</a:t>
             </a:r>
             <a:endParaRPr lang="en-US" dirty="0"/>
           </a:p>
@@ -8096,7 +8092,7 @@
           <a:p>
             <a:fld id="{7053BEFA-1175-F644-B249-7D41D72BD3FF}" type="datetime1">
               <a:rPr lang="en-US" smtClean="0"/>
-              <a:t>3/22/14</a:t>
+              <a:t>3/25/14</a:t>
             </a:fld>
             <a:endParaRPr lang="en-US"/>
           </a:p>
@@ -8154,6 +8150,13 @@
   <p:clrMapOvr>
     <a:masterClrMapping/>
   </p:clrMapOvr>
+  <p:timing>
+    <p:tnLst>
+      <p:par>
+        <p:cTn xmlns:p14="http://schemas.microsoft.com/office/powerpoint/2010/main" id="1" dur="indefinite" restart="never" nodeType="tmRoot"/>
+      </p:par>
+    </p:tnLst>
+  </p:timing>
 </p:sld>
 </file>
 
@@ -8257,7 +8260,7 @@
           <a:p>
             <a:fld id="{7053BEFA-1175-F644-B249-7D41D72BD3FF}" type="datetime1">
               <a:rPr lang="en-US" smtClean="0"/>
-              <a:t>3/22/14</a:t>
+              <a:t>3/25/14</a:t>
             </a:fld>
             <a:endParaRPr lang="en-US"/>
           </a:p>
@@ -8315,6 +8318,13 @@
   <p:clrMapOvr>
     <a:masterClrMapping/>
   </p:clrMapOvr>
+  <p:timing>
+    <p:tnLst>
+      <p:par>
+        <p:cTn xmlns:p14="http://schemas.microsoft.com/office/powerpoint/2010/main" id="1" dur="indefinite" restart="never" nodeType="tmRoot"/>
+      </p:par>
+    </p:tnLst>
+  </p:timing>
 </p:sld>
 </file>
 
@@ -8477,6 +8487,13 @@
   <p:clrMapOvr>
     <a:masterClrMapping/>
   </p:clrMapOvr>
+  <p:timing>
+    <p:tnLst>
+      <p:par>
+        <p:cTn xmlns:p14="http://schemas.microsoft.com/office/powerpoint/2010/main" id="1" dur="indefinite" restart="never" nodeType="tmRoot"/>
+      </p:par>
+    </p:tnLst>
+  </p:timing>
 </p:sld>
 </file>
 
@@ -8648,6 +8665,13 @@
   <p:clrMapOvr>
     <a:masterClrMapping/>
   </p:clrMapOvr>
+  <p:timing>
+    <p:tnLst>
+      <p:par>
+        <p:cTn xmlns:p14="http://schemas.microsoft.com/office/powerpoint/2010/main" id="1" dur="indefinite" restart="never" nodeType="tmRoot"/>
+      </p:par>
+    </p:tnLst>
+  </p:timing>
 </p:sld>
 </file>
 

</xml_diff>